<commit_message>
adding sanger seqs and tagseq summary
</commit_message>
<xml_diff>
--- a/Protocols/20231212_Poc_corhort_develomental_exposire.pptx
+++ b/Protocols/20231212_Poc_corhort_develomental_exposire.pptx
@@ -104,6 +104,11 @@
       </a:defRPr>
     </a:lvl9pPr>
   </p:defaultTextStyle>
+  <p:extLst>
+    <p:ext uri="{EFAFB233-063F-42B5-8137-9DF3F51BA10A}">
+      <p15:sldGuideLst xmlns:p15="http://schemas.microsoft.com/office/powerpoint/2012/main"/>
+    </p:ext>
+  </p:extLst>
 </p:presentation>
 </file>
 
@@ -254,7 +259,7 @@
           <a:p>
             <a:fld id="{94BA8787-B77E-0D47-994A-ABDBD6BDC65D}" type="datetimeFigureOut">
               <a:rPr lang="en-US" smtClean="0"/>
-              <a:t>3/25/24</a:t>
+              <a:t>4/7/24</a:t>
             </a:fld>
             <a:endParaRPr lang="en-US"/>
           </a:p>
@@ -452,7 +457,7 @@
           <a:p>
             <a:fld id="{94BA8787-B77E-0D47-994A-ABDBD6BDC65D}" type="datetimeFigureOut">
               <a:rPr lang="en-US" smtClean="0"/>
-              <a:t>3/25/24</a:t>
+              <a:t>4/7/24</a:t>
             </a:fld>
             <a:endParaRPr lang="en-US"/>
           </a:p>
@@ -660,7 +665,7 @@
           <a:p>
             <a:fld id="{94BA8787-B77E-0D47-994A-ABDBD6BDC65D}" type="datetimeFigureOut">
               <a:rPr lang="en-US" smtClean="0"/>
-              <a:t>3/25/24</a:t>
+              <a:t>4/7/24</a:t>
             </a:fld>
             <a:endParaRPr lang="en-US"/>
           </a:p>
@@ -858,7 +863,7 @@
           <a:p>
             <a:fld id="{94BA8787-B77E-0D47-994A-ABDBD6BDC65D}" type="datetimeFigureOut">
               <a:rPr lang="en-US" smtClean="0"/>
-              <a:t>3/25/24</a:t>
+              <a:t>4/7/24</a:t>
             </a:fld>
             <a:endParaRPr lang="en-US"/>
           </a:p>
@@ -1133,7 +1138,7 @@
           <a:p>
             <a:fld id="{94BA8787-B77E-0D47-994A-ABDBD6BDC65D}" type="datetimeFigureOut">
               <a:rPr lang="en-US" smtClean="0"/>
-              <a:t>3/25/24</a:t>
+              <a:t>4/7/24</a:t>
             </a:fld>
             <a:endParaRPr lang="en-US"/>
           </a:p>
@@ -1398,7 +1403,7 @@
           <a:p>
             <a:fld id="{94BA8787-B77E-0D47-994A-ABDBD6BDC65D}" type="datetimeFigureOut">
               <a:rPr lang="en-US" smtClean="0"/>
-              <a:t>3/25/24</a:t>
+              <a:t>4/7/24</a:t>
             </a:fld>
             <a:endParaRPr lang="en-US"/>
           </a:p>
@@ -1810,7 +1815,7 @@
           <a:p>
             <a:fld id="{94BA8787-B77E-0D47-994A-ABDBD6BDC65D}" type="datetimeFigureOut">
               <a:rPr lang="en-US" smtClean="0"/>
-              <a:t>3/25/24</a:t>
+              <a:t>4/7/24</a:t>
             </a:fld>
             <a:endParaRPr lang="en-US"/>
           </a:p>
@@ -1951,7 +1956,7 @@
           <a:p>
             <a:fld id="{94BA8787-B77E-0D47-994A-ABDBD6BDC65D}" type="datetimeFigureOut">
               <a:rPr lang="en-US" smtClean="0"/>
-              <a:t>3/25/24</a:t>
+              <a:t>4/7/24</a:t>
             </a:fld>
             <a:endParaRPr lang="en-US"/>
           </a:p>
@@ -2064,7 +2069,7 @@
           <a:p>
             <a:fld id="{94BA8787-B77E-0D47-994A-ABDBD6BDC65D}" type="datetimeFigureOut">
               <a:rPr lang="en-US" smtClean="0"/>
-              <a:t>3/25/24</a:t>
+              <a:t>4/7/24</a:t>
             </a:fld>
             <a:endParaRPr lang="en-US"/>
           </a:p>
@@ -2375,7 +2380,7 @@
           <a:p>
             <a:fld id="{94BA8787-B77E-0D47-994A-ABDBD6BDC65D}" type="datetimeFigureOut">
               <a:rPr lang="en-US" smtClean="0"/>
-              <a:t>3/25/24</a:t>
+              <a:t>4/7/24</a:t>
             </a:fld>
             <a:endParaRPr lang="en-US"/>
           </a:p>
@@ -2663,7 +2668,7 @@
           <a:p>
             <a:fld id="{94BA8787-B77E-0D47-994A-ABDBD6BDC65D}" type="datetimeFigureOut">
               <a:rPr lang="en-US" smtClean="0"/>
-              <a:t>3/25/24</a:t>
+              <a:t>4/7/24</a:t>
             </a:fld>
             <a:endParaRPr lang="en-US"/>
           </a:p>
@@ -2904,7 +2909,7 @@
           <a:p>
             <a:fld id="{94BA8787-B77E-0D47-994A-ABDBD6BDC65D}" type="datetimeFigureOut">
               <a:rPr lang="en-US" smtClean="0"/>
-              <a:t>3/25/24</a:t>
+              <a:t>4/7/24</a:t>
             </a:fld>
             <a:endParaRPr lang="en-US"/>
           </a:p>
@@ -4439,7 +4444,7 @@
         <p:spPr>
           <a:xfrm>
             <a:off x="24033" y="-45820"/>
-            <a:ext cx="1428597" cy="830997"/>
+            <a:ext cx="5348537" cy="461665"/>
           </a:xfrm>
           <a:prstGeom prst="rect">
             <a:avLst/>
@@ -4447,22 +4452,18 @@
           <a:noFill/>
         </p:spPr>
         <p:txBody>
-          <a:bodyPr wrap="none" rtlCol="0">
+          <a:bodyPr wrap="square" rtlCol="0">
             <a:spAutoFit/>
           </a:bodyPr>
           <a:lstStyle/>
           <a:p>
-            <a:pPr algn="ctr"/>
+            <a:r>
+              <a:rPr lang="en-US" sz="2400" b="1" i="1" dirty="0"/>
+              <a:t>Pocillopora verrucosa </a:t>
+            </a:r>
             <a:r>
               <a:rPr lang="en-US" sz="2400" b="1" dirty="0"/>
-              <a:t>20231212</a:t>
-            </a:r>
-          </a:p>
-          <a:p>
-            <a:pPr algn="ctr"/>
-            <a:r>
-              <a:rPr lang="en-US" sz="2400" b="1" dirty="0"/>
-              <a:t>Cohort</a:t>
+              <a:t>20231212 Cohort</a:t>
             </a:r>
           </a:p>
         </p:txBody>
@@ -4483,12 +4484,18 @@
         </p:nvSpPr>
         <p:spPr>
           <a:xfrm>
-            <a:off x="3044852" y="1906663"/>
+            <a:off x="3072988" y="1906663"/>
             <a:ext cx="137060" cy="137160"/>
           </a:xfrm>
           <a:prstGeom prst="ellipse">
             <a:avLst/>
           </a:prstGeom>
+          <a:solidFill>
+            <a:schemeClr val="tx1"/>
+          </a:solidFill>
+          <a:ln>
+            <a:noFill/>
+          </a:ln>
         </p:spPr>
         <p:style>
           <a:lnRef idx="2">
@@ -4537,6 +4544,12 @@
           <a:prstGeom prst="ellipse">
             <a:avLst/>
           </a:prstGeom>
+          <a:solidFill>
+            <a:schemeClr val="tx1"/>
+          </a:solidFill>
+          <a:ln>
+            <a:noFill/>
+          </a:ln>
         </p:spPr>
         <p:style>
           <a:lnRef idx="2">
@@ -4585,6 +4598,12 @@
           <a:prstGeom prst="ellipse">
             <a:avLst/>
           </a:prstGeom>
+          <a:solidFill>
+            <a:schemeClr val="tx1"/>
+          </a:solidFill>
+          <a:ln>
+            <a:noFill/>
+          </a:ln>
         </p:spPr>
         <p:style>
           <a:lnRef idx="2">
@@ -4633,6 +4652,12 @@
           <a:prstGeom prst="ellipse">
             <a:avLst/>
           </a:prstGeom>
+          <a:solidFill>
+            <a:schemeClr val="tx1"/>
+          </a:solidFill>
+          <a:ln>
+            <a:noFill/>
+          </a:ln>
         </p:spPr>
         <p:style>
           <a:lnRef idx="2">
@@ -4681,6 +4706,12 @@
           <a:prstGeom prst="ellipse">
             <a:avLst/>
           </a:prstGeom>
+          <a:solidFill>
+            <a:schemeClr val="tx1"/>
+          </a:solidFill>
+          <a:ln>
+            <a:noFill/>
+          </a:ln>
         </p:spPr>
         <p:style>
           <a:lnRef idx="2">
@@ -4729,6 +4760,12 @@
           <a:prstGeom prst="ellipse">
             <a:avLst/>
           </a:prstGeom>
+          <a:solidFill>
+            <a:schemeClr val="tx1"/>
+          </a:solidFill>
+          <a:ln>
+            <a:noFill/>
+          </a:ln>
         </p:spPr>
         <p:style>
           <a:lnRef idx="2">
@@ -4777,6 +4814,12 @@
           <a:prstGeom prst="ellipse">
             <a:avLst/>
           </a:prstGeom>
+          <a:solidFill>
+            <a:schemeClr val="tx1"/>
+          </a:solidFill>
+          <a:ln>
+            <a:noFill/>
+          </a:ln>
         </p:spPr>
         <p:style>
           <a:lnRef idx="2">
@@ -4825,6 +4868,12 @@
           <a:prstGeom prst="ellipse">
             <a:avLst/>
           </a:prstGeom>
+          <a:solidFill>
+            <a:schemeClr val="tx1"/>
+          </a:solidFill>
+          <a:ln>
+            <a:noFill/>
+          </a:ln>
         </p:spPr>
         <p:style>
           <a:lnRef idx="2">
@@ -4873,6 +4922,12 @@
           <a:prstGeom prst="ellipse">
             <a:avLst/>
           </a:prstGeom>
+          <a:solidFill>
+            <a:schemeClr val="tx1"/>
+          </a:solidFill>
+          <a:ln>
+            <a:noFill/>
+          </a:ln>
         </p:spPr>
         <p:style>
           <a:lnRef idx="2">
@@ -4915,7 +4970,7 @@
         </p:nvSpPr>
         <p:spPr>
           <a:xfrm>
-            <a:off x="2961264" y="266265"/>
+            <a:off x="8251553" y="251387"/>
             <a:ext cx="137060" cy="137160"/>
           </a:xfrm>
           <a:prstGeom prst="ellipse">
@@ -4969,7 +5024,7 @@
         </p:nvSpPr>
         <p:spPr>
           <a:xfrm>
-            <a:off x="3117000" y="148318"/>
+            <a:off x="8407289" y="135301"/>
             <a:ext cx="1011880" cy="369332"/>
           </a:xfrm>
           <a:prstGeom prst="rect">
@@ -5451,7 +5506,7 @@
         </p:nvSpPr>
         <p:spPr>
           <a:xfrm>
-            <a:off x="4398251" y="151835"/>
+            <a:off x="9688540" y="135301"/>
             <a:ext cx="755335" cy="369332"/>
           </a:xfrm>
           <a:prstGeom prst="rect">
@@ -5486,7 +5541,7 @@
         </p:nvSpPr>
         <p:spPr>
           <a:xfrm>
-            <a:off x="4244804" y="247932"/>
+            <a:off x="9535093" y="251387"/>
             <a:ext cx="137160" cy="137160"/>
           </a:xfrm>
           <a:prstGeom prst="star5">
@@ -5602,6 +5657,12 @@
           <a:prstGeom prst="ellipse">
             <a:avLst/>
           </a:prstGeom>
+          <a:solidFill>
+            <a:schemeClr val="tx1"/>
+          </a:solidFill>
+          <a:ln>
+            <a:noFill/>
+          </a:ln>
         </p:spPr>
         <p:style>
           <a:lnRef idx="2">
@@ -5775,6 +5836,12 @@
           <a:prstGeom prst="ellipse">
             <a:avLst/>
           </a:prstGeom>
+          <a:solidFill>
+            <a:schemeClr val="tx1"/>
+          </a:solidFill>
+          <a:ln>
+            <a:noFill/>
+          </a:ln>
         </p:spPr>
         <p:style>
           <a:lnRef idx="2">
@@ -5815,7 +5882,7 @@
         </p:nvSpPr>
         <p:spPr>
           <a:xfrm>
-            <a:off x="5241705" y="187422"/>
+            <a:off x="10531994" y="196192"/>
             <a:ext cx="227964" cy="247551"/>
           </a:xfrm>
           <a:prstGeom prst="lightningBolt">
@@ -5864,7 +5931,7 @@
         </p:nvSpPr>
         <p:spPr>
           <a:xfrm>
-            <a:off x="5444180" y="114465"/>
+            <a:off x="10734469" y="135301"/>
             <a:ext cx="1158972" cy="369332"/>
           </a:xfrm>
           <a:prstGeom prst="rect">
@@ -6220,59 +6287,11 @@
           <a:prstGeom prst="ellipse">
             <a:avLst/>
           </a:prstGeom>
-        </p:spPr>
-        <p:style>
-          <a:lnRef idx="2">
-            <a:schemeClr val="accent1">
-              <a:shade val="50000"/>
-            </a:schemeClr>
-          </a:lnRef>
-          <a:fillRef idx="1">
-            <a:schemeClr val="accent1"/>
-          </a:fillRef>
-          <a:effectRef idx="0">
-            <a:schemeClr val="accent1"/>
-          </a:effectRef>
-          <a:fontRef idx="minor">
-            <a:schemeClr val="lt1"/>
-          </a:fontRef>
-        </p:style>
-        <p:txBody>
-          <a:bodyPr rtlCol="0" anchor="ctr"/>
-          <a:lstStyle/>
-          <a:p>
-            <a:pPr algn="ctr"/>
-            <a:endParaRPr lang="en-US"/>
-          </a:p>
-        </p:txBody>
-      </p:sp>
-      <p:sp>
-        <p:nvSpPr>
-          <p:cNvPr id="99" name="5-Point Star 98">
-            <a:extLst>
-              <a:ext uri="{FF2B5EF4-FFF2-40B4-BE49-F238E27FC236}">
-                <a16:creationId xmlns:a16="http://schemas.microsoft.com/office/drawing/2014/main" id="{273622B9-1529-4A40-8BEB-D94091CE3124}"/>
-              </a:ext>
-            </a:extLst>
-          </p:cNvPr>
-          <p:cNvSpPr/>
-          <p:nvPr/>
-        </p:nvSpPr>
-        <p:spPr>
-          <a:xfrm>
-            <a:off x="3727862" y="6303566"/>
-            <a:ext cx="137160" cy="137160"/>
-          </a:xfrm>
-          <a:prstGeom prst="star5">
-            <a:avLst/>
-          </a:prstGeom>
           <a:solidFill>
             <a:schemeClr val="tx1"/>
           </a:solidFill>
           <a:ln>
-            <a:solidFill>
-              <a:schemeClr val="tx1"/>
-            </a:solidFill>
+            <a:noFill/>
           </a:ln>
         </p:spPr>
         <p:style>

</xml_diff>